<commit_message>
add weekly report pdf & group meeting pptx
</commit_message>
<xml_diff>
--- a/master/研究生工作/实验室中文PPT模板.pptx
+++ b/master/研究生工作/实验室中文PPT模板.pptx
@@ -10,8 +10,8 @@
   <p:sldIdLst>
     <p:sldId id="256" r:id="rId2"/>
     <p:sldId id="257" r:id="rId3"/>
-    <p:sldId id="260" r:id="rId4"/>
-    <p:sldId id="258" r:id="rId5"/>
+    <p:sldId id="261" r:id="rId4"/>
+    <p:sldId id="266" r:id="rId5"/>
   </p:sldIdLst>
   <p:sldSz cx="12192000" cy="6858000"/>
   <p:notesSz cx="6858000" cy="9144000"/>
@@ -200,7 +200,7 @@
           <a:p>
             <a:fld id="{43A6A8BD-C49D-0048-BFB2-D42EEAE99376}" type="datetimeFigureOut">
               <a:rPr kumimoji="1" lang="zh-CN" altLang="en-US" smtClean="0"/>
-              <a:t>2020.10.30</a:t>
+              <a:t>2020.12.06</a:t>
             </a:fld>
             <a:endParaRPr kumimoji="1" lang="zh-CN" altLang="en-US"/>
           </a:p>
@@ -1009,7 +1009,7 @@
     </p:spTree>
     <p:extLst>
       <p:ext uri="{BB962C8B-B14F-4D97-AF65-F5344CB8AC3E}">
-        <p14:creationId xmlns:p14="http://schemas.microsoft.com/office/powerpoint/2010/main" val="1360860357"/>
+        <p14:creationId xmlns:p14="http://schemas.microsoft.com/office/powerpoint/2010/main" val="1362878022"/>
       </p:ext>
     </p:extLst>
   </p:cSld>
@@ -1063,7 +1063,7 @@
           <a:bodyPr/>
           <a:lstStyle/>
           <a:p>
-            <a:endParaRPr kumimoji="1" lang="zh-CN" altLang="en-US" dirty="0"/>
+            <a:endParaRPr kumimoji="1" lang="zh-CN" altLang="en-US"/>
           </a:p>
         </p:txBody>
       </p:sp>
@@ -1093,7 +1093,7 @@
     </p:spTree>
     <p:extLst>
       <p:ext uri="{BB962C8B-B14F-4D97-AF65-F5344CB8AC3E}">
-        <p14:creationId xmlns:p14="http://schemas.microsoft.com/office/powerpoint/2010/main" val="3632348012"/>
+        <p14:creationId xmlns:p14="http://schemas.microsoft.com/office/powerpoint/2010/main" val="446084653"/>
       </p:ext>
     </p:extLst>
   </p:cSld>
@@ -1258,7 +1258,7 @@
           <a:p>
             <a:fld id="{EDD9BC12-7CE0-2344-9A1E-943D7D86BB3C}" type="datetime1">
               <a:rPr kumimoji="1" lang="zh-CN" altLang="en-US" smtClean="0"/>
-              <a:t>2020.10.30</a:t>
+              <a:t>2020.12.06</a:t>
             </a:fld>
             <a:endParaRPr kumimoji="1" lang="zh-CN" altLang="en-US"/>
           </a:p>
@@ -1428,7 +1428,7 @@
           <a:p>
             <a:fld id="{91C06B60-5671-EA4C-9361-E42A603F5044}" type="datetime1">
               <a:rPr kumimoji="1" lang="zh-CN" altLang="en-US" smtClean="0"/>
-              <a:t>2020.10.30</a:t>
+              <a:t>2020.12.06</a:t>
             </a:fld>
             <a:endParaRPr kumimoji="1" lang="zh-CN" altLang="en-US"/>
           </a:p>
@@ -1608,7 +1608,7 @@
           <a:p>
             <a:fld id="{ACF77D76-A4B7-FB4C-9F23-3499EF120D88}" type="datetime1">
               <a:rPr kumimoji="1" lang="zh-CN" altLang="en-US" smtClean="0"/>
-              <a:t>2020.10.30</a:t>
+              <a:t>2020.12.06</a:t>
             </a:fld>
             <a:endParaRPr kumimoji="1" lang="zh-CN" altLang="en-US"/>
           </a:p>
@@ -1842,7 +1842,7 @@
           <a:p>
             <a:fld id="{F93318F9-9614-1A45-A3BC-410E101800BB}" type="datetime1">
               <a:rPr kumimoji="1" lang="zh-CN" altLang="en-US" smtClean="0"/>
-              <a:t>2020.10.30</a:t>
+              <a:t>2020.12.06</a:t>
             </a:fld>
             <a:endParaRPr kumimoji="1" lang="zh-CN" altLang="en-US"/>
           </a:p>
@@ -2117,7 +2117,7 @@
           <a:p>
             <a:fld id="{0F1906C0-1E2A-3B45-8D2B-845F9960A1E2}" type="datetime1">
               <a:rPr kumimoji="1" lang="zh-CN" altLang="en-US" smtClean="0"/>
-              <a:t>2020.10.30</a:t>
+              <a:t>2020.12.06</a:t>
             </a:fld>
             <a:endParaRPr kumimoji="1" lang="zh-CN" altLang="en-US"/>
           </a:p>
@@ -2352,7 +2352,7 @@
           <a:p>
             <a:fld id="{B47DA175-E50F-124A-A7EE-6231F7116BE0}" type="datetime1">
               <a:rPr kumimoji="1" lang="zh-CN" altLang="en-US" smtClean="0"/>
-              <a:t>2020.10.30</a:t>
+              <a:t>2020.12.06</a:t>
             </a:fld>
             <a:endParaRPr kumimoji="1" lang="zh-CN" altLang="en-US"/>
           </a:p>
@@ -2708,7 +2708,7 @@
           <a:p>
             <a:fld id="{17A8FC5C-B301-C849-89D6-7467770338A6}" type="datetime1">
               <a:rPr kumimoji="1" lang="zh-CN" altLang="en-US" smtClean="0"/>
-              <a:t>2020.10.30</a:t>
+              <a:t>2020.12.06</a:t>
             </a:fld>
             <a:endParaRPr kumimoji="1" lang="zh-CN" altLang="en-US"/>
           </a:p>
@@ -2849,7 +2849,7 @@
           <a:p>
             <a:fld id="{AF44B86B-B0A4-DF47-8F8F-9A8263402C82}" type="datetime1">
               <a:rPr kumimoji="1" lang="zh-CN" altLang="en-US" smtClean="0"/>
-              <a:t>2020.10.30</a:t>
+              <a:t>2020.12.06</a:t>
             </a:fld>
             <a:endParaRPr kumimoji="1" lang="zh-CN" altLang="en-US"/>
           </a:p>
@@ -2962,7 +2962,7 @@
           <a:p>
             <a:fld id="{389C279D-8514-674D-9B8A-0C3572E9C912}" type="datetime1">
               <a:rPr kumimoji="1" lang="zh-CN" altLang="en-US" smtClean="0"/>
-              <a:t>2020.10.30</a:t>
+              <a:t>2020.12.06</a:t>
             </a:fld>
             <a:endParaRPr kumimoji="1" lang="zh-CN" altLang="en-US"/>
           </a:p>
@@ -3245,7 +3245,7 @@
           <a:p>
             <a:fld id="{F585E63D-82FD-5A4B-A074-2490653C2491}" type="datetime1">
               <a:rPr kumimoji="1" lang="zh-CN" altLang="en-US" smtClean="0"/>
-              <a:t>2020.10.30</a:t>
+              <a:t>2020.12.06</a:t>
             </a:fld>
             <a:endParaRPr kumimoji="1" lang="zh-CN" altLang="en-US"/>
           </a:p>
@@ -3536,7 +3536,7 @@
           <a:p>
             <a:fld id="{94E529F4-15CC-F644-A018-0EC935AC3153}" type="datetime1">
               <a:rPr kumimoji="1" lang="zh-CN" altLang="en-US" smtClean="0"/>
-              <a:t>2020.10.30</a:t>
+              <a:t>2020.12.06</a:t>
             </a:fld>
             <a:endParaRPr kumimoji="1" lang="zh-CN" altLang="en-US"/>
           </a:p>
@@ -3769,7 +3769,7 @@
           <a:p>
             <a:fld id="{93F7A511-8F1C-AB42-A849-9D0FEFE624FD}" type="datetime1">
               <a:rPr kumimoji="1" lang="zh-CN" altLang="en-US" smtClean="0"/>
-              <a:t>2020.10.30</a:t>
+              <a:t>2020.12.06</a:t>
             </a:fld>
             <a:endParaRPr kumimoji="1" lang="zh-CN" altLang="en-US"/>
           </a:p>
@@ -4228,23 +4228,7 @@
                   <a:srgbClr val="FFC000"/>
                 </a:solidFill>
               </a:rPr>
-              <a:t>中文</a:t>
-            </a:r>
-            <a:r>
-              <a:rPr kumimoji="1" lang="en-US" altLang="zh-CN" sz="3600" dirty="0">
-                <a:solidFill>
-                  <a:srgbClr val="FFC000"/>
-                </a:solidFill>
-              </a:rPr>
-              <a:t>PPT</a:t>
-            </a:r>
-            <a:r>
-              <a:rPr kumimoji="1" lang="zh-CN" altLang="en-US" sz="3600" dirty="0">
-                <a:solidFill>
-                  <a:srgbClr val="FFC000"/>
-                </a:solidFill>
-              </a:rPr>
-              <a:t>模板</a:t>
+              <a:t>离题检测</a:t>
             </a:r>
           </a:p>
         </p:txBody>
@@ -4294,7 +4278,7 @@
                   </a:schemeClr>
                 </a:solidFill>
               </a:rPr>
-              <a:t>宋巍</a:t>
+              <a:t>屈原斌</a:t>
             </a:r>
             <a:endParaRPr kumimoji="1" lang="en-US" altLang="zh-CN" sz="2000" b="1" dirty="0">
               <a:solidFill>
@@ -4306,8 +4290,8 @@
           </a:p>
           <a:p>
             <a:r>
-              <a:rPr kumimoji="1" lang="en-US" altLang="zh-CN" sz="2000" b="1" dirty="0" err="1"/>
-              <a:t>wsong@cnu.edu.cn</a:t>
+              <a:rPr kumimoji="1" lang="en-US" altLang="zh-CN" sz="2000" b="1" dirty="0"/>
+              <a:t>ybqu@cnu.edu.cn</a:t>
             </a:r>
             <a:endParaRPr kumimoji="1" lang="en-US" altLang="zh-CN" sz="2000" b="1" dirty="0">
               <a:solidFill>
@@ -4349,7 +4333,7 @@
           <a:p>
             <a:fld id="{B8482288-F197-A548-9996-FE5E03972E94}" type="datetime1">
               <a:rPr kumimoji="1" lang="zh-CN" altLang="en-US" smtClean="0"/>
-              <a:t>2020.10.30</a:t>
+              <a:t>2020.12.06</a:t>
             </a:fld>
             <a:endParaRPr kumimoji="1" lang="zh-CN" altLang="en-US"/>
           </a:p>
@@ -4465,35 +4449,35 @@
           <a:p>
             <a:r>
               <a:rPr kumimoji="1" lang="zh-CN" altLang="en-US" dirty="0"/>
-              <a:t>简介</a:t>
+              <a:t>离题问题概述</a:t>
             </a:r>
             <a:endParaRPr kumimoji="1" lang="en-US" altLang="zh-CN" dirty="0"/>
           </a:p>
           <a:p>
             <a:r>
               <a:rPr kumimoji="1" lang="zh-CN" altLang="en-US" dirty="0"/>
-              <a:t>相关工作</a:t>
+              <a:t>选题意义及背景</a:t>
             </a:r>
             <a:endParaRPr kumimoji="1" lang="en-US" altLang="zh-CN" dirty="0"/>
           </a:p>
           <a:p>
             <a:r>
               <a:rPr kumimoji="1" lang="zh-CN" altLang="en-US" dirty="0"/>
-              <a:t>提出的方法</a:t>
+              <a:t>国内外研究现状与发展</a:t>
             </a:r>
             <a:endParaRPr kumimoji="1" lang="en-US" altLang="zh-CN" dirty="0"/>
           </a:p>
           <a:p>
             <a:r>
               <a:rPr kumimoji="1" lang="zh-CN" altLang="en-US" dirty="0"/>
-              <a:t>实验</a:t>
+              <a:t>研究内容及方案</a:t>
             </a:r>
             <a:endParaRPr kumimoji="1" lang="en-US" altLang="zh-CN" dirty="0"/>
           </a:p>
           <a:p>
             <a:r>
               <a:rPr kumimoji="1" lang="zh-CN" altLang="en-US" dirty="0"/>
-              <a:t>结论</a:t>
+              <a:t>研究计划与进度</a:t>
             </a:r>
             <a:endParaRPr kumimoji="1" lang="en-US" altLang="zh-CN" dirty="0"/>
           </a:p>
@@ -4522,7 +4506,7 @@
           <a:p>
             <a:fld id="{F93318F9-9614-1A45-A3BC-410E101800BB}" type="datetime1">
               <a:rPr kumimoji="1" lang="zh-CN" altLang="en-US" smtClean="0"/>
-              <a:t>2020.10.30</a:t>
+              <a:t>2020.12.06</a:t>
             </a:fld>
             <a:endParaRPr kumimoji="1" lang="zh-CN" altLang="en-US"/>
           </a:p>
@@ -4638,7 +4622,7 @@
           <a:p>
             <a:r>
               <a:rPr kumimoji="1" lang="zh-CN" altLang="en-US" dirty="0"/>
-              <a:t>简介</a:t>
+              <a:t>离题问题概述</a:t>
             </a:r>
             <a:endParaRPr kumimoji="1" lang="en-US" altLang="zh-CN" dirty="0"/>
           </a:p>
@@ -4651,7 +4635,7 @@
                   </a:schemeClr>
                 </a:solidFill>
               </a:rPr>
-              <a:t>相关工作</a:t>
+              <a:t>选题意义及背景</a:t>
             </a:r>
             <a:endParaRPr kumimoji="1" lang="en-US" altLang="zh-CN" dirty="0">
               <a:solidFill>
@@ -4670,7 +4654,7 @@
                   </a:schemeClr>
                 </a:solidFill>
               </a:rPr>
-              <a:t>提出的方法</a:t>
+              <a:t>国内外研究现状与发展</a:t>
             </a:r>
             <a:endParaRPr kumimoji="1" lang="en-US" altLang="zh-CN" dirty="0">
               <a:solidFill>
@@ -4689,7 +4673,7 @@
                   </a:schemeClr>
                 </a:solidFill>
               </a:rPr>
-              <a:t>实验</a:t>
+              <a:t>研究内容及方案</a:t>
             </a:r>
             <a:endParaRPr kumimoji="1" lang="en-US" altLang="zh-CN" dirty="0">
               <a:solidFill>
@@ -4708,7 +4692,7 @@
                   </a:schemeClr>
                 </a:solidFill>
               </a:rPr>
-              <a:t>结论</a:t>
+              <a:t>研究计划与进度</a:t>
             </a:r>
             <a:endParaRPr kumimoji="1" lang="en-US" altLang="zh-CN" dirty="0">
               <a:solidFill>
@@ -4743,7 +4727,7 @@
           <a:p>
             <a:fld id="{F93318F9-9614-1A45-A3BC-410E101800BB}" type="datetime1">
               <a:rPr kumimoji="1" lang="zh-CN" altLang="en-US" smtClean="0"/>
-              <a:t>2020.10.30</a:t>
+              <a:t>2020.12.06</a:t>
             </a:fld>
             <a:endParaRPr kumimoji="1" lang="zh-CN" altLang="en-US"/>
           </a:p>
@@ -4781,7 +4765,7 @@
     </p:spTree>
     <p:extLst>
       <p:ext uri="{BB962C8B-B14F-4D97-AF65-F5344CB8AC3E}">
-        <p14:creationId xmlns:p14="http://schemas.microsoft.com/office/powerpoint/2010/main" val="3361233015"/>
+        <p14:creationId xmlns:p14="http://schemas.microsoft.com/office/powerpoint/2010/main" val="1492329547"/>
       </p:ext>
     </p:extLst>
   </p:cSld>
@@ -4813,7 +4797,7 @@
           <p:cNvPr id="2" name="标题 1">
             <a:extLst>
               <a:ext uri="{FF2B5EF4-FFF2-40B4-BE49-F238E27FC236}">
-                <a16:creationId xmlns:a16="http://schemas.microsoft.com/office/drawing/2014/main" id="{80C7B2FD-95FA-1948-A3FA-4E68773A1863}"/>
+                <a16:creationId xmlns:a16="http://schemas.microsoft.com/office/drawing/2014/main" id="{9979C3FE-1767-1C4B-9F05-B5BBFD317BEA}"/>
               </a:ext>
             </a:extLst>
           </p:cNvPr>
@@ -4830,9 +4814,10 @@
           <a:lstStyle/>
           <a:p>
             <a:r>
-              <a:rPr kumimoji="1" lang="zh-CN" altLang="en-US" dirty="0"/>
-              <a:t>简介</a:t>
-            </a:r>
+              <a:rPr kumimoji="1" lang="zh-CN" altLang="en-US"/>
+              <a:t>离题问题概述</a:t>
+            </a:r>
+            <a:endParaRPr kumimoji="1" lang="zh-CN" altLang="en-US" dirty="0"/>
           </a:p>
         </p:txBody>
       </p:sp>
@@ -4841,7 +4826,7 @@
           <p:cNvPr id="3" name="内容占位符 2">
             <a:extLst>
               <a:ext uri="{FF2B5EF4-FFF2-40B4-BE49-F238E27FC236}">
-                <a16:creationId xmlns:a16="http://schemas.microsoft.com/office/drawing/2014/main" id="{F53E8FE9-422E-BF4D-9C1A-D628CBFC85D2}"/>
+                <a16:creationId xmlns:a16="http://schemas.microsoft.com/office/drawing/2014/main" id="{1FF8DA3B-D7E1-3F4E-9342-205AFD6C648A}"/>
               </a:ext>
             </a:extLst>
           </p:cNvPr>
@@ -4852,12 +4837,7 @@
             <p:ph idx="1"/>
           </p:nvPr>
         </p:nvSpPr>
-        <p:spPr>
-          <a:xfrm>
-            <a:off x="838200" y="1717878"/>
-            <a:ext cx="10515600" cy="4351338"/>
-          </a:xfrm>
-        </p:spPr>
+        <p:spPr/>
         <p:txBody>
           <a:bodyPr/>
           <a:lstStyle/>
@@ -4904,18 +4884,70 @@
             </a:r>
             <a:endParaRPr kumimoji="1" lang="en-US" altLang="zh-CN" dirty="0"/>
           </a:p>
-          <a:p>
-            <a:pPr marL="457200" lvl="1" indent="0">
-              <a:buNone/>
-            </a:pPr>
-            <a:endParaRPr kumimoji="1" lang="zh-CN" altLang="en-US" dirty="0"/>
+        </p:txBody>
+      </p:sp>
+      <p:sp>
+        <p:nvSpPr>
+          <p:cNvPr id="4" name="日期占位符 3">
+            <a:extLst>
+              <a:ext uri="{FF2B5EF4-FFF2-40B4-BE49-F238E27FC236}">
+                <a16:creationId xmlns:a16="http://schemas.microsoft.com/office/drawing/2014/main" id="{86944423-4253-3B44-A448-1507F0E38705}"/>
+              </a:ext>
+            </a:extLst>
+          </p:cNvPr>
+          <p:cNvSpPr>
+            <a:spLocks noGrp="1"/>
+          </p:cNvSpPr>
+          <p:nvPr>
+            <p:ph type="dt" sz="half" idx="10"/>
+          </p:nvPr>
+        </p:nvSpPr>
+        <p:spPr/>
+        <p:txBody>
+          <a:bodyPr/>
+          <a:lstStyle/>
+          <a:p>
+            <a:fld id="{F93318F9-9614-1A45-A3BC-410E101800BB}" type="datetime1">
+              <a:rPr kumimoji="1" lang="zh-CN" altLang="en-US" smtClean="0"/>
+              <a:t>2020.12.06</a:t>
+            </a:fld>
+            <a:endParaRPr kumimoji="1" lang="zh-CN" altLang="en-US"/>
+          </a:p>
+        </p:txBody>
+      </p:sp>
+      <p:sp>
+        <p:nvSpPr>
+          <p:cNvPr id="5" name="灯片编号占位符 4">
+            <a:extLst>
+              <a:ext uri="{FF2B5EF4-FFF2-40B4-BE49-F238E27FC236}">
+                <a16:creationId xmlns:a16="http://schemas.microsoft.com/office/drawing/2014/main" id="{FB2775EC-D3BA-854F-919D-CDDC18436C56}"/>
+              </a:ext>
+            </a:extLst>
+          </p:cNvPr>
+          <p:cNvSpPr>
+            <a:spLocks noGrp="1"/>
+          </p:cNvSpPr>
+          <p:nvPr>
+            <p:ph type="sldNum" sz="quarter" idx="12"/>
+          </p:nvPr>
+        </p:nvSpPr>
+        <p:spPr/>
+        <p:txBody>
+          <a:bodyPr/>
+          <a:lstStyle/>
+          <a:p>
+            <a:fld id="{E704A4A4-CBB6-AB41-9966-F86452EE4B5C}" type="slidenum">
+              <a:rPr kumimoji="1" lang="zh-CN" altLang="en-US" smtClean="0"/>
+              <a:t>4</a:t>
+            </a:fld>
+            <a:endParaRPr kumimoji="1" lang="zh-CN" altLang="en-US"/>
           </a:p>
         </p:txBody>
       </p:sp>
     </p:spTree>
     <p:extLst>
       <p:ext uri="{BB962C8B-B14F-4D97-AF65-F5344CB8AC3E}">
-        <p14:creationId xmlns:p14="http://schemas.microsoft.com/office/powerpoint/2010/main" val="809018569"/>
+        <p14:creationId xmlns:p14="http://schemas.microsoft.com/office/powerpoint/2010/main" val="1387515787"/>
       </p:ext>
     </p:extLst>
   </p:cSld>

</xml_diff>